<commit_message>
penambahan materi pengenalan openCV dan dasar2 gambar dan latihan
</commit_message>
<xml_diff>
--- a/Materi/Dasar-Dasar python (List,Array,Matriks) .pptx
+++ b/Materi/Dasar-Dasar python (List,Array,Matriks) .pptx
@@ -5,7 +5,7 @@
     <p:sldMasterId id="2147483660" r:id="rId4"/>
   </p:sldMasterIdLst>
   <p:notesMasterIdLst>
-    <p:notesMasterId r:id="rId24"/>
+    <p:notesMasterId r:id="rId25"/>
   </p:notesMasterIdLst>
   <p:sldIdLst>
     <p:sldId id="256" r:id="rId5"/>
@@ -26,7 +26,8 @@
     <p:sldId id="287" r:id="rId20"/>
     <p:sldId id="288" r:id="rId21"/>
     <p:sldId id="289" r:id="rId22"/>
-    <p:sldId id="272" r:id="rId23"/>
+    <p:sldId id="290" r:id="rId23"/>
+    <p:sldId id="272" r:id="rId24"/>
   </p:sldIdLst>
   <p:sldSz cx="12192000" cy="6858000"/>
   <p:notesSz cx="6858000" cy="9144000"/>
@@ -148,6 +149,7 @@
             <p14:sldId id="287"/>
             <p14:sldId id="288"/>
             <p14:sldId id="289"/>
+            <p14:sldId id="290"/>
             <p14:sldId id="272"/>
           </p14:sldIdLst>
         </p14:section>
@@ -166,6 +168,9 @@
           </p15:clr>
         </p15:guide>
       </p15:sldGuideLst>
+    </p:ext>
+    <p:ext uri="{2D200454-40CA-4A62-9FC3-DE9A4176ACB9}">
+      <p15:notesGuideLst xmlns:p15="http://schemas.microsoft.com/office/powerpoint/2012/main"/>
     </p:ext>
   </p:extLst>
 </p:presentation>
@@ -6552,7 +6557,6 @@
               <a:rPr lang="en-US" dirty="0"/>
               <a:t>1</a:t>
             </a:r>
-            <a:endParaRPr lang="en-US" dirty="0"/>
           </a:p>
         </p:txBody>
       </p:sp>
@@ -6614,7 +6618,6 @@
               <a:rPr lang="en-US" dirty="0"/>
               <a:t>3</a:t>
             </a:r>
-            <a:endParaRPr lang="en-US" dirty="0"/>
           </a:p>
         </p:txBody>
       </p:sp>
@@ -6645,7 +6648,6 @@
               <a:rPr lang="en-US" dirty="0"/>
               <a:t>4</a:t>
             </a:r>
-            <a:endParaRPr lang="en-US" dirty="0"/>
           </a:p>
         </p:txBody>
       </p:sp>
@@ -11036,7 +11038,7 @@
             <a:spLocks noGrp="1"/>
           </p:cNvSpPr>
           <p:nvPr>
-            <p:ph type="ctrTitle"/>
+            <p:ph type="title"/>
           </p:nvPr>
         </p:nvSpPr>
         <p:spPr/>
@@ -11045,96 +11047,43 @@
           <a:lstStyle/>
           <a:p>
             <a:r>
+              <a:rPr lang="en-US" b="1" dirty="0" err="1" smtClean="0"/>
+              <a:t>Operasi</a:t>
+            </a:r>
+            <a:r>
               <a:rPr lang="en-US" b="1" dirty="0" smtClean="0"/>
-              <a:t>TERIMAH </a:t>
+              <a:t> </a:t>
+            </a:r>
+            <a:r>
+              <a:rPr lang="en-US" b="1" dirty="0" err="1" smtClean="0"/>
+              <a:t>Matimatika</a:t>
             </a:r>
             <a:r>
               <a:rPr lang="en-US" b="1" dirty="0" smtClean="0"/>
-              <a:t>KASIH</a:t>
+              <a:t> </a:t>
+            </a:r>
+            <a:r>
+              <a:rPr lang="en-US" b="1" dirty="0" err="1" smtClean="0"/>
+              <a:t>pada</a:t>
+            </a:r>
+            <a:r>
+              <a:rPr lang="en-US" b="1" dirty="0" smtClean="0"/>
+              <a:t> Array</a:t>
             </a:r>
             <a:endParaRPr lang="en-US" b="1" dirty="0"/>
-          </a:p>
-        </p:txBody>
-      </p:sp>
-      <p:sp>
-        <p:nvSpPr>
-          <p:cNvPr id="3" name="TextBox 2"/>
-          <p:cNvSpPr txBox="1"/>
-          <p:nvPr/>
-        </p:nvSpPr>
-        <p:spPr>
-          <a:xfrm>
-            <a:off x="951323" y="4348340"/>
-            <a:ext cx="5359651" cy="461665"/>
-          </a:xfrm>
-          <a:prstGeom prst="rect">
-            <a:avLst/>
-          </a:prstGeom>
-          <a:noFill/>
-        </p:spPr>
-        <p:txBody>
-          <a:bodyPr wrap="square" rtlCol="0">
-            <a:spAutoFit/>
-          </a:bodyPr>
-          <a:lstStyle/>
-          <a:p>
-            <a:r>
-              <a:rPr lang="en-US" sz="2400" dirty="0" err="1" smtClean="0">
-                <a:solidFill>
-                  <a:schemeClr val="bg1"/>
-                </a:solidFill>
-              </a:rPr>
-              <a:t>Selemat</a:t>
-            </a:r>
-            <a:r>
-              <a:rPr lang="en-US" sz="2400" dirty="0" smtClean="0">
-                <a:solidFill>
-                  <a:schemeClr val="bg1"/>
-                </a:solidFill>
-              </a:rPr>
-              <a:t> </a:t>
-            </a:r>
-            <a:r>
-              <a:rPr lang="en-US" sz="2400" dirty="0" err="1" smtClean="0">
-                <a:solidFill>
-                  <a:schemeClr val="bg1"/>
-                </a:solidFill>
-              </a:rPr>
-              <a:t>Belajar</a:t>
-            </a:r>
-            <a:r>
-              <a:rPr lang="en-US" sz="2400" dirty="0" smtClean="0">
-                <a:solidFill>
-                  <a:schemeClr val="bg1"/>
-                </a:solidFill>
-              </a:rPr>
-              <a:t>..</a:t>
-            </a:r>
-            <a:endParaRPr lang="en-US" sz="2400" dirty="0">
-              <a:solidFill>
-                <a:schemeClr val="bg1"/>
-              </a:solidFill>
-            </a:endParaRPr>
           </a:p>
         </p:txBody>
       </p:sp>
     </p:spTree>
     <p:extLst>
       <p:ext uri="{BB962C8B-B14F-4D97-AF65-F5344CB8AC3E}">
-        <p14:creationId xmlns:p14="http://schemas.microsoft.com/office/powerpoint/2010/main" val="1828634948"/>
+        <p14:creationId xmlns:p14="http://schemas.microsoft.com/office/powerpoint/2010/main" val="1105855350"/>
       </p:ext>
     </p:extLst>
   </p:cSld>
   <p:clrMapOvr>
     <a:masterClrMapping/>
   </p:clrMapOvr>
-  <p:timing>
-    <p:tnLst>
-      <p:par>
-        <p:cTn id="1" dur="indefinite" restart="never" nodeType="tmRoot"/>
-      </p:par>
-    </p:tnLst>
-  </p:timing>
 </p:sld>
 </file>
 
@@ -12917,6 +12866,128 @@
   <p:clrMapOvr>
     <a:masterClrMapping/>
   </p:clrMapOvr>
+</p:sld>
+</file>
+
+<file path=ppt/slides/slide20.xml><?xml version="1.0" encoding="utf-8"?>
+<p:sld xmlns:a="http://schemas.openxmlformats.org/drawingml/2006/main" xmlns:r="http://schemas.openxmlformats.org/officeDocument/2006/relationships" xmlns:p="http://schemas.openxmlformats.org/presentationml/2006/main">
+  <p:cSld>
+    <p:spTree>
+      <p:nvGrpSpPr>
+        <p:cNvPr id="1" name=""/>
+        <p:cNvGrpSpPr/>
+        <p:nvPr/>
+      </p:nvGrpSpPr>
+      <p:grpSpPr>
+        <a:xfrm>
+          <a:off x="0" y="0"/>
+          <a:ext cx="0" cy="0"/>
+          <a:chOff x="0" y="0"/>
+          <a:chExt cx="0" cy="0"/>
+        </a:xfrm>
+      </p:grpSpPr>
+      <p:sp>
+        <p:nvSpPr>
+          <p:cNvPr id="2" name="Title 1"/>
+          <p:cNvSpPr>
+            <a:spLocks noGrp="1"/>
+          </p:cNvSpPr>
+          <p:nvPr>
+            <p:ph type="ctrTitle"/>
+          </p:nvPr>
+        </p:nvSpPr>
+        <p:spPr/>
+        <p:txBody>
+          <a:bodyPr/>
+          <a:lstStyle/>
+          <a:p>
+            <a:r>
+              <a:rPr lang="en-US" b="1" dirty="0" smtClean="0"/>
+              <a:t>TERIMAH KASIH</a:t>
+            </a:r>
+            <a:endParaRPr lang="en-US" b="1" dirty="0"/>
+          </a:p>
+        </p:txBody>
+      </p:sp>
+      <p:sp>
+        <p:nvSpPr>
+          <p:cNvPr id="3" name="TextBox 2"/>
+          <p:cNvSpPr txBox="1"/>
+          <p:nvPr/>
+        </p:nvSpPr>
+        <p:spPr>
+          <a:xfrm>
+            <a:off x="951323" y="4348340"/>
+            <a:ext cx="5359651" cy="461665"/>
+          </a:xfrm>
+          <a:prstGeom prst="rect">
+            <a:avLst/>
+          </a:prstGeom>
+          <a:noFill/>
+        </p:spPr>
+        <p:txBody>
+          <a:bodyPr wrap="square" rtlCol="0">
+            <a:spAutoFit/>
+          </a:bodyPr>
+          <a:lstStyle/>
+          <a:p>
+            <a:r>
+              <a:rPr lang="en-US" sz="2400" dirty="0" err="1" smtClean="0">
+                <a:solidFill>
+                  <a:schemeClr val="bg1"/>
+                </a:solidFill>
+              </a:rPr>
+              <a:t>Selemat</a:t>
+            </a:r>
+            <a:r>
+              <a:rPr lang="en-US" sz="2400" dirty="0" smtClean="0">
+                <a:solidFill>
+                  <a:schemeClr val="bg1"/>
+                </a:solidFill>
+              </a:rPr>
+              <a:t> </a:t>
+            </a:r>
+            <a:r>
+              <a:rPr lang="en-US" sz="2400" dirty="0" err="1" smtClean="0">
+                <a:solidFill>
+                  <a:schemeClr val="bg1"/>
+                </a:solidFill>
+              </a:rPr>
+              <a:t>Belajar</a:t>
+            </a:r>
+            <a:r>
+              <a:rPr lang="en-US" sz="2400" dirty="0" smtClean="0">
+                <a:solidFill>
+                  <a:schemeClr val="bg1"/>
+                </a:solidFill>
+              </a:rPr>
+              <a:t>..</a:t>
+            </a:r>
+            <a:endParaRPr lang="en-US" sz="2400" dirty="0">
+              <a:solidFill>
+                <a:schemeClr val="bg1"/>
+              </a:solidFill>
+            </a:endParaRPr>
+          </a:p>
+        </p:txBody>
+      </p:sp>
+    </p:spTree>
+    <p:extLst>
+      <p:ext uri="{BB962C8B-B14F-4D97-AF65-F5344CB8AC3E}">
+        <p14:creationId xmlns:p14="http://schemas.microsoft.com/office/powerpoint/2010/main" val="1828634948"/>
+      </p:ext>
+    </p:extLst>
+  </p:cSld>
+  <p:clrMapOvr>
+    <a:masterClrMapping/>
+  </p:clrMapOvr>
+  <p:timing>
+    <p:tnLst>
+      <p:par>
+        <p:cTn id="1" dur="indefinite" restart="never" nodeType="tmRoot"/>
+      </p:par>
+    </p:tnLst>
+  </p:timing>
 </p:sld>
 </file>
 
@@ -17801,6 +17872,132 @@
 </file>
 
 <file path=customXml/item1.xml><?xml version="1.0" encoding="utf-8"?>
+<p:properties xmlns:p="http://schemas.microsoft.com/office/2006/metadata/properties" xmlns:xsi="http://www.w3.org/2001/XMLSchema-instance" xmlns:pc="http://schemas.microsoft.com/office/infopath/2007/PartnerControls">
+  <documentManagement>
+    <DirectSourceMarket xmlns="4873beb7-5857-4685-be1f-d57550cc96cc" xsi:nil="true"/>
+    <ApprovalStatus xmlns="4873beb7-5857-4685-be1f-d57550cc96cc">InProgress</ApprovalStatus>
+    <MarketSpecific xmlns="4873beb7-5857-4685-be1f-d57550cc96cc">false</MarketSpecific>
+    <LocComments xmlns="4873beb7-5857-4685-be1f-d57550cc96cc" xsi:nil="true"/>
+    <ThumbnailAssetId xmlns="4873beb7-5857-4685-be1f-d57550cc96cc" xsi:nil="true"/>
+    <PrimaryImageGen xmlns="4873beb7-5857-4685-be1f-d57550cc96cc">true</PrimaryImageGen>
+    <LegacyData xmlns="4873beb7-5857-4685-be1f-d57550cc96cc" xsi:nil="true"/>
+    <LocRecommendedHandoff xmlns="4873beb7-5857-4685-be1f-d57550cc96cc" xsi:nil="true"/>
+    <BusinessGroup xmlns="4873beb7-5857-4685-be1f-d57550cc96cc" xsi:nil="true"/>
+    <BlockPublish xmlns="4873beb7-5857-4685-be1f-d57550cc96cc">false</BlockPublish>
+    <TPFriendlyName xmlns="4873beb7-5857-4685-be1f-d57550cc96cc" xsi:nil="true"/>
+    <NumericId xmlns="4873beb7-5857-4685-be1f-d57550cc96cc" xsi:nil="true"/>
+    <APEditor xmlns="4873beb7-5857-4685-be1f-d57550cc96cc">
+      <UserInfo>
+        <DisplayName/>
+        <AccountId xsi:nil="true"/>
+        <AccountType/>
+      </UserInfo>
+    </APEditor>
+    <SourceTitle xmlns="4873beb7-5857-4685-be1f-d57550cc96cc" xsi:nil="true"/>
+    <OpenTemplate xmlns="4873beb7-5857-4685-be1f-d57550cc96cc">true</OpenTemplate>
+    <UALocComments xmlns="4873beb7-5857-4685-be1f-d57550cc96cc" xsi:nil="true"/>
+    <ParentAssetId xmlns="4873beb7-5857-4685-be1f-d57550cc96cc" xsi:nil="true"/>
+    <IntlLangReviewDate xmlns="4873beb7-5857-4685-be1f-d57550cc96cc" xsi:nil="true"/>
+    <FeatureTagsTaxHTField0 xmlns="4873beb7-5857-4685-be1f-d57550cc96cc">
+      <Terms xmlns="http://schemas.microsoft.com/office/infopath/2007/PartnerControls"/>
+    </FeatureTagsTaxHTField0>
+    <PublishStatusLookup xmlns="4873beb7-5857-4685-be1f-d57550cc96cc">
+      <Value>1584528</Value>
+    </PublishStatusLookup>
+    <Providers xmlns="4873beb7-5857-4685-be1f-d57550cc96cc" xsi:nil="true"/>
+    <MachineTranslated xmlns="4873beb7-5857-4685-be1f-d57550cc96cc">false</MachineTranslated>
+    <OriginalSourceMarket xmlns="4873beb7-5857-4685-be1f-d57550cc96cc" xsi:nil="true"/>
+    <APDescription xmlns="4873beb7-5857-4685-be1f-d57550cc96cc" xsi:nil="true"/>
+    <ClipArtFilename xmlns="4873beb7-5857-4685-be1f-d57550cc96cc" xsi:nil="true"/>
+    <ContentItem xmlns="4873beb7-5857-4685-be1f-d57550cc96cc" xsi:nil="true"/>
+    <TPInstallLocation xmlns="4873beb7-5857-4685-be1f-d57550cc96cc" xsi:nil="true"/>
+    <PublishTargets xmlns="4873beb7-5857-4685-be1f-d57550cc96cc">OfficeOnlineVNext</PublishTargets>
+    <TimesCloned xmlns="4873beb7-5857-4685-be1f-d57550cc96cc" xsi:nil="true"/>
+    <AssetStart xmlns="4873beb7-5857-4685-be1f-d57550cc96cc">2012-06-20T23:39:00+00:00</AssetStart>
+    <Provider xmlns="4873beb7-5857-4685-be1f-d57550cc96cc" xsi:nil="true"/>
+    <AcquiredFrom xmlns="4873beb7-5857-4685-be1f-d57550cc96cc">Internal MS</AcquiredFrom>
+    <FriendlyTitle xmlns="4873beb7-5857-4685-be1f-d57550cc96cc" xsi:nil="true"/>
+    <LastHandOff xmlns="4873beb7-5857-4685-be1f-d57550cc96cc" xsi:nil="true"/>
+    <TPClientViewer xmlns="4873beb7-5857-4685-be1f-d57550cc96cc" xsi:nil="true"/>
+    <UACurrentWords xmlns="4873beb7-5857-4685-be1f-d57550cc96cc" xsi:nil="true"/>
+    <ArtSampleDocs xmlns="4873beb7-5857-4685-be1f-d57550cc96cc" xsi:nil="true"/>
+    <UALocRecommendation xmlns="4873beb7-5857-4685-be1f-d57550cc96cc">Localize</UALocRecommendation>
+    <Manager xmlns="4873beb7-5857-4685-be1f-d57550cc96cc" xsi:nil="true"/>
+    <ShowIn xmlns="4873beb7-5857-4685-be1f-d57550cc96cc">Show everywhere</ShowIn>
+    <UANotes xmlns="4873beb7-5857-4685-be1f-d57550cc96cc" xsi:nil="true"/>
+    <TemplateStatus xmlns="4873beb7-5857-4685-be1f-d57550cc96cc">Complete</TemplateStatus>
+    <InternalTagsTaxHTField0 xmlns="4873beb7-5857-4685-be1f-d57550cc96cc">
+      <Terms xmlns="http://schemas.microsoft.com/office/infopath/2007/PartnerControls"/>
+    </InternalTagsTaxHTField0>
+    <CSXHash xmlns="4873beb7-5857-4685-be1f-d57550cc96cc" xsi:nil="true"/>
+    <Downloads xmlns="4873beb7-5857-4685-be1f-d57550cc96cc">0</Downloads>
+    <VoteCount xmlns="4873beb7-5857-4685-be1f-d57550cc96cc" xsi:nil="true"/>
+    <OOCacheId xmlns="4873beb7-5857-4685-be1f-d57550cc96cc" xsi:nil="true"/>
+    <IsDeleted xmlns="4873beb7-5857-4685-be1f-d57550cc96cc">false</IsDeleted>
+    <AssetExpire xmlns="4873beb7-5857-4685-be1f-d57550cc96cc">2029-01-01T08:00:00+00:00</AssetExpire>
+    <DSATActionTaken xmlns="4873beb7-5857-4685-be1f-d57550cc96cc" xsi:nil="true"/>
+    <CSXSubmissionMarket xmlns="4873beb7-5857-4685-be1f-d57550cc96cc" xsi:nil="true"/>
+    <TPExecutable xmlns="4873beb7-5857-4685-be1f-d57550cc96cc" xsi:nil="true"/>
+    <SubmitterId xmlns="4873beb7-5857-4685-be1f-d57550cc96cc" xsi:nil="true"/>
+    <EditorialTags xmlns="4873beb7-5857-4685-be1f-d57550cc96cc" xsi:nil="true"/>
+    <ApprovalLog xmlns="4873beb7-5857-4685-be1f-d57550cc96cc" xsi:nil="true"/>
+    <AssetType xmlns="4873beb7-5857-4685-be1f-d57550cc96cc">TP</AssetType>
+    <BugNumber xmlns="4873beb7-5857-4685-be1f-d57550cc96cc" xsi:nil="true"/>
+    <CSXSubmissionDate xmlns="4873beb7-5857-4685-be1f-d57550cc96cc" xsi:nil="true"/>
+    <CSXUpdate xmlns="4873beb7-5857-4685-be1f-d57550cc96cc">false</CSXUpdate>
+    <Milestone xmlns="4873beb7-5857-4685-be1f-d57550cc96cc" xsi:nil="true"/>
+    <RecommendationsModifier xmlns="4873beb7-5857-4685-be1f-d57550cc96cc" xsi:nil="true"/>
+    <OriginAsset xmlns="4873beb7-5857-4685-be1f-d57550cc96cc" xsi:nil="true"/>
+    <TPComponent xmlns="4873beb7-5857-4685-be1f-d57550cc96cc" xsi:nil="true"/>
+    <AssetId xmlns="4873beb7-5857-4685-be1f-d57550cc96cc">TP102923943</AssetId>
+    <IntlLocPriority xmlns="4873beb7-5857-4685-be1f-d57550cc96cc" xsi:nil="true"/>
+    <PolicheckWords xmlns="4873beb7-5857-4685-be1f-d57550cc96cc" xsi:nil="true"/>
+    <TPLaunchHelpLink xmlns="4873beb7-5857-4685-be1f-d57550cc96cc" xsi:nil="true"/>
+    <TPApplication xmlns="4873beb7-5857-4685-be1f-d57550cc96cc" xsi:nil="true"/>
+    <CrawlForDependencies xmlns="4873beb7-5857-4685-be1f-d57550cc96cc">false</CrawlForDependencies>
+    <HandoffToMSDN xmlns="4873beb7-5857-4685-be1f-d57550cc96cc" xsi:nil="true"/>
+    <PlannedPubDate xmlns="4873beb7-5857-4685-be1f-d57550cc96cc" xsi:nil="true"/>
+    <IntlLangReviewer xmlns="4873beb7-5857-4685-be1f-d57550cc96cc" xsi:nil="true"/>
+    <TrustLevel xmlns="4873beb7-5857-4685-be1f-d57550cc96cc">1 Microsoft Managed Content</TrustLevel>
+    <LocLastLocAttemptVersionLookup xmlns="4873beb7-5857-4685-be1f-d57550cc96cc">843282</LocLastLocAttemptVersionLookup>
+    <IsSearchable xmlns="4873beb7-5857-4685-be1f-d57550cc96cc">true</IsSearchable>
+    <TemplateTemplateType xmlns="4873beb7-5857-4685-be1f-d57550cc96cc">PowerPoint Template - Slideshow Launch</TemplateTemplateType>
+    <CampaignTagsTaxHTField0 xmlns="4873beb7-5857-4685-be1f-d57550cc96cc">
+      <Terms xmlns="http://schemas.microsoft.com/office/infopath/2007/PartnerControls"/>
+    </CampaignTagsTaxHTField0>
+    <TPNamespace xmlns="4873beb7-5857-4685-be1f-d57550cc96cc" xsi:nil="true"/>
+    <TaxCatchAll xmlns="4873beb7-5857-4685-be1f-d57550cc96cc"/>
+    <Markets xmlns="4873beb7-5857-4685-be1f-d57550cc96cc"/>
+    <UAProjectedTotalWords xmlns="4873beb7-5857-4685-be1f-d57550cc96cc" xsi:nil="true"/>
+    <IntlLangReview xmlns="4873beb7-5857-4685-be1f-d57550cc96cc">false</IntlLangReview>
+    <OutputCachingOn xmlns="4873beb7-5857-4685-be1f-d57550cc96cc">false</OutputCachingOn>
+    <AverageRating xmlns="4873beb7-5857-4685-be1f-d57550cc96cc" xsi:nil="true"/>
+    <LocMarketGroupTiers2 xmlns="4873beb7-5857-4685-be1f-d57550cc96cc" xsi:nil="true"/>
+    <APAuthor xmlns="4873beb7-5857-4685-be1f-d57550cc96cc">
+      <UserInfo>
+        <DisplayName>REDMOND\v-sa</DisplayName>
+        <AccountId>2467</AccountId>
+        <AccountType/>
+      </UserInfo>
+    </APAuthor>
+    <LocManualTestRequired xmlns="4873beb7-5857-4685-be1f-d57550cc96cc">false</LocManualTestRequired>
+    <TPCommandLine xmlns="4873beb7-5857-4685-be1f-d57550cc96cc" xsi:nil="true"/>
+    <TPAppVersion xmlns="4873beb7-5857-4685-be1f-d57550cc96cc" xsi:nil="true"/>
+    <EditorialStatus xmlns="4873beb7-5857-4685-be1f-d57550cc96cc">Complete</EditorialStatus>
+    <LastModifiedDateTime xmlns="4873beb7-5857-4685-be1f-d57550cc96cc" xsi:nil="true"/>
+    <ScenarioTagsTaxHTField0 xmlns="4873beb7-5857-4685-be1f-d57550cc96cc">
+      <Terms xmlns="http://schemas.microsoft.com/office/infopath/2007/PartnerControls"/>
+    </ScenarioTagsTaxHTField0>
+    <OriginalRelease xmlns="4873beb7-5857-4685-be1f-d57550cc96cc">15</OriginalRelease>
+    <TPLaunchHelpLinkType xmlns="4873beb7-5857-4685-be1f-d57550cc96cc">Template</TPLaunchHelpLinkType>
+    <LocalizationTagsTaxHTField0 xmlns="4873beb7-5857-4685-be1f-d57550cc96cc">
+      <Terms xmlns="http://schemas.microsoft.com/office/infopath/2007/PartnerControls"/>
+    </LocalizationTagsTaxHTField0>
+  </documentManagement>
+</p:properties>
+</file>
+
+<file path=customXml/item2.xml><?xml version="1.0" encoding="utf-8"?>
 <ct:contentTypeSchema xmlns:ct="http://schemas.microsoft.com/office/2006/metadata/contentType" xmlns:ma="http://schemas.microsoft.com/office/2006/metadata/properties/metaAttributes" ct:_="" ma:_="" ma:contentTypeName="TemplateFile" ma:contentTypeID="0x0101006EDDDB5EE6D98C44930B742096920B300400F5B6D36B3EF94B4E9A635CDF2A18F5B8" ma:contentTypeVersion="72" ma:contentTypeDescription="Create a new document." ma:contentTypeScope="" ma:versionID="a23e56308344d904b51738559c3d67c9">
   <xsd:schema xmlns:xsd="http://www.w3.org/2001/XMLSchema" xmlns:xs="http://www.w3.org/2001/XMLSchema" xmlns:p="http://schemas.microsoft.com/office/2006/metadata/properties" xmlns:ns2="4873beb7-5857-4685-be1f-d57550cc96cc" targetNamespace="http://schemas.microsoft.com/office/2006/metadata/properties" ma:root="true" ma:fieldsID="cd0908cc4600e77bf5da051303e00c8d" ns2:_="">
     <xsd:import namespace="4873beb7-5857-4685-be1f-d57550cc96cc"/>
@@ -18840,132 +19037,6 @@
 </ct:contentTypeSchema>
 </file>
 
-<file path=customXml/item2.xml><?xml version="1.0" encoding="utf-8"?>
-<p:properties xmlns:p="http://schemas.microsoft.com/office/2006/metadata/properties" xmlns:xsi="http://www.w3.org/2001/XMLSchema-instance" xmlns:pc="http://schemas.microsoft.com/office/infopath/2007/PartnerControls">
-  <documentManagement>
-    <DirectSourceMarket xmlns="4873beb7-5857-4685-be1f-d57550cc96cc" xsi:nil="true"/>
-    <ApprovalStatus xmlns="4873beb7-5857-4685-be1f-d57550cc96cc">InProgress</ApprovalStatus>
-    <MarketSpecific xmlns="4873beb7-5857-4685-be1f-d57550cc96cc">false</MarketSpecific>
-    <LocComments xmlns="4873beb7-5857-4685-be1f-d57550cc96cc" xsi:nil="true"/>
-    <ThumbnailAssetId xmlns="4873beb7-5857-4685-be1f-d57550cc96cc" xsi:nil="true"/>
-    <PrimaryImageGen xmlns="4873beb7-5857-4685-be1f-d57550cc96cc">true</PrimaryImageGen>
-    <LegacyData xmlns="4873beb7-5857-4685-be1f-d57550cc96cc" xsi:nil="true"/>
-    <LocRecommendedHandoff xmlns="4873beb7-5857-4685-be1f-d57550cc96cc" xsi:nil="true"/>
-    <BusinessGroup xmlns="4873beb7-5857-4685-be1f-d57550cc96cc" xsi:nil="true"/>
-    <BlockPublish xmlns="4873beb7-5857-4685-be1f-d57550cc96cc">false</BlockPublish>
-    <TPFriendlyName xmlns="4873beb7-5857-4685-be1f-d57550cc96cc" xsi:nil="true"/>
-    <NumericId xmlns="4873beb7-5857-4685-be1f-d57550cc96cc" xsi:nil="true"/>
-    <APEditor xmlns="4873beb7-5857-4685-be1f-d57550cc96cc">
-      <UserInfo>
-        <DisplayName/>
-        <AccountId xsi:nil="true"/>
-        <AccountType/>
-      </UserInfo>
-    </APEditor>
-    <SourceTitle xmlns="4873beb7-5857-4685-be1f-d57550cc96cc" xsi:nil="true"/>
-    <OpenTemplate xmlns="4873beb7-5857-4685-be1f-d57550cc96cc">true</OpenTemplate>
-    <UALocComments xmlns="4873beb7-5857-4685-be1f-d57550cc96cc" xsi:nil="true"/>
-    <ParentAssetId xmlns="4873beb7-5857-4685-be1f-d57550cc96cc" xsi:nil="true"/>
-    <IntlLangReviewDate xmlns="4873beb7-5857-4685-be1f-d57550cc96cc" xsi:nil="true"/>
-    <FeatureTagsTaxHTField0 xmlns="4873beb7-5857-4685-be1f-d57550cc96cc">
-      <Terms xmlns="http://schemas.microsoft.com/office/infopath/2007/PartnerControls"/>
-    </FeatureTagsTaxHTField0>
-    <PublishStatusLookup xmlns="4873beb7-5857-4685-be1f-d57550cc96cc">
-      <Value>1584528</Value>
-    </PublishStatusLookup>
-    <Providers xmlns="4873beb7-5857-4685-be1f-d57550cc96cc" xsi:nil="true"/>
-    <MachineTranslated xmlns="4873beb7-5857-4685-be1f-d57550cc96cc">false</MachineTranslated>
-    <OriginalSourceMarket xmlns="4873beb7-5857-4685-be1f-d57550cc96cc" xsi:nil="true"/>
-    <APDescription xmlns="4873beb7-5857-4685-be1f-d57550cc96cc" xsi:nil="true"/>
-    <ClipArtFilename xmlns="4873beb7-5857-4685-be1f-d57550cc96cc" xsi:nil="true"/>
-    <ContentItem xmlns="4873beb7-5857-4685-be1f-d57550cc96cc" xsi:nil="true"/>
-    <TPInstallLocation xmlns="4873beb7-5857-4685-be1f-d57550cc96cc" xsi:nil="true"/>
-    <PublishTargets xmlns="4873beb7-5857-4685-be1f-d57550cc96cc">OfficeOnlineVNext</PublishTargets>
-    <TimesCloned xmlns="4873beb7-5857-4685-be1f-d57550cc96cc" xsi:nil="true"/>
-    <AssetStart xmlns="4873beb7-5857-4685-be1f-d57550cc96cc">2012-06-20T23:39:00+00:00</AssetStart>
-    <Provider xmlns="4873beb7-5857-4685-be1f-d57550cc96cc" xsi:nil="true"/>
-    <AcquiredFrom xmlns="4873beb7-5857-4685-be1f-d57550cc96cc">Internal MS</AcquiredFrom>
-    <FriendlyTitle xmlns="4873beb7-5857-4685-be1f-d57550cc96cc" xsi:nil="true"/>
-    <LastHandOff xmlns="4873beb7-5857-4685-be1f-d57550cc96cc" xsi:nil="true"/>
-    <TPClientViewer xmlns="4873beb7-5857-4685-be1f-d57550cc96cc" xsi:nil="true"/>
-    <UACurrentWords xmlns="4873beb7-5857-4685-be1f-d57550cc96cc" xsi:nil="true"/>
-    <ArtSampleDocs xmlns="4873beb7-5857-4685-be1f-d57550cc96cc" xsi:nil="true"/>
-    <UALocRecommendation xmlns="4873beb7-5857-4685-be1f-d57550cc96cc">Localize</UALocRecommendation>
-    <Manager xmlns="4873beb7-5857-4685-be1f-d57550cc96cc" xsi:nil="true"/>
-    <ShowIn xmlns="4873beb7-5857-4685-be1f-d57550cc96cc">Show everywhere</ShowIn>
-    <UANotes xmlns="4873beb7-5857-4685-be1f-d57550cc96cc" xsi:nil="true"/>
-    <TemplateStatus xmlns="4873beb7-5857-4685-be1f-d57550cc96cc">Complete</TemplateStatus>
-    <InternalTagsTaxHTField0 xmlns="4873beb7-5857-4685-be1f-d57550cc96cc">
-      <Terms xmlns="http://schemas.microsoft.com/office/infopath/2007/PartnerControls"/>
-    </InternalTagsTaxHTField0>
-    <CSXHash xmlns="4873beb7-5857-4685-be1f-d57550cc96cc" xsi:nil="true"/>
-    <Downloads xmlns="4873beb7-5857-4685-be1f-d57550cc96cc">0</Downloads>
-    <VoteCount xmlns="4873beb7-5857-4685-be1f-d57550cc96cc" xsi:nil="true"/>
-    <OOCacheId xmlns="4873beb7-5857-4685-be1f-d57550cc96cc" xsi:nil="true"/>
-    <IsDeleted xmlns="4873beb7-5857-4685-be1f-d57550cc96cc">false</IsDeleted>
-    <AssetExpire xmlns="4873beb7-5857-4685-be1f-d57550cc96cc">2029-01-01T08:00:00+00:00</AssetExpire>
-    <DSATActionTaken xmlns="4873beb7-5857-4685-be1f-d57550cc96cc" xsi:nil="true"/>
-    <CSXSubmissionMarket xmlns="4873beb7-5857-4685-be1f-d57550cc96cc" xsi:nil="true"/>
-    <TPExecutable xmlns="4873beb7-5857-4685-be1f-d57550cc96cc" xsi:nil="true"/>
-    <SubmitterId xmlns="4873beb7-5857-4685-be1f-d57550cc96cc" xsi:nil="true"/>
-    <EditorialTags xmlns="4873beb7-5857-4685-be1f-d57550cc96cc" xsi:nil="true"/>
-    <ApprovalLog xmlns="4873beb7-5857-4685-be1f-d57550cc96cc" xsi:nil="true"/>
-    <AssetType xmlns="4873beb7-5857-4685-be1f-d57550cc96cc">TP</AssetType>
-    <BugNumber xmlns="4873beb7-5857-4685-be1f-d57550cc96cc" xsi:nil="true"/>
-    <CSXSubmissionDate xmlns="4873beb7-5857-4685-be1f-d57550cc96cc" xsi:nil="true"/>
-    <CSXUpdate xmlns="4873beb7-5857-4685-be1f-d57550cc96cc">false</CSXUpdate>
-    <Milestone xmlns="4873beb7-5857-4685-be1f-d57550cc96cc" xsi:nil="true"/>
-    <RecommendationsModifier xmlns="4873beb7-5857-4685-be1f-d57550cc96cc" xsi:nil="true"/>
-    <OriginAsset xmlns="4873beb7-5857-4685-be1f-d57550cc96cc" xsi:nil="true"/>
-    <TPComponent xmlns="4873beb7-5857-4685-be1f-d57550cc96cc" xsi:nil="true"/>
-    <AssetId xmlns="4873beb7-5857-4685-be1f-d57550cc96cc">TP102923943</AssetId>
-    <IntlLocPriority xmlns="4873beb7-5857-4685-be1f-d57550cc96cc" xsi:nil="true"/>
-    <PolicheckWords xmlns="4873beb7-5857-4685-be1f-d57550cc96cc" xsi:nil="true"/>
-    <TPLaunchHelpLink xmlns="4873beb7-5857-4685-be1f-d57550cc96cc" xsi:nil="true"/>
-    <TPApplication xmlns="4873beb7-5857-4685-be1f-d57550cc96cc" xsi:nil="true"/>
-    <CrawlForDependencies xmlns="4873beb7-5857-4685-be1f-d57550cc96cc">false</CrawlForDependencies>
-    <HandoffToMSDN xmlns="4873beb7-5857-4685-be1f-d57550cc96cc" xsi:nil="true"/>
-    <PlannedPubDate xmlns="4873beb7-5857-4685-be1f-d57550cc96cc" xsi:nil="true"/>
-    <IntlLangReviewer xmlns="4873beb7-5857-4685-be1f-d57550cc96cc" xsi:nil="true"/>
-    <TrustLevel xmlns="4873beb7-5857-4685-be1f-d57550cc96cc">1 Microsoft Managed Content</TrustLevel>
-    <LocLastLocAttemptVersionLookup xmlns="4873beb7-5857-4685-be1f-d57550cc96cc">843282</LocLastLocAttemptVersionLookup>
-    <IsSearchable xmlns="4873beb7-5857-4685-be1f-d57550cc96cc">true</IsSearchable>
-    <TemplateTemplateType xmlns="4873beb7-5857-4685-be1f-d57550cc96cc">PowerPoint Template - Slideshow Launch</TemplateTemplateType>
-    <CampaignTagsTaxHTField0 xmlns="4873beb7-5857-4685-be1f-d57550cc96cc">
-      <Terms xmlns="http://schemas.microsoft.com/office/infopath/2007/PartnerControls"/>
-    </CampaignTagsTaxHTField0>
-    <TPNamespace xmlns="4873beb7-5857-4685-be1f-d57550cc96cc" xsi:nil="true"/>
-    <TaxCatchAll xmlns="4873beb7-5857-4685-be1f-d57550cc96cc"/>
-    <Markets xmlns="4873beb7-5857-4685-be1f-d57550cc96cc"/>
-    <UAProjectedTotalWords xmlns="4873beb7-5857-4685-be1f-d57550cc96cc" xsi:nil="true"/>
-    <IntlLangReview xmlns="4873beb7-5857-4685-be1f-d57550cc96cc">false</IntlLangReview>
-    <OutputCachingOn xmlns="4873beb7-5857-4685-be1f-d57550cc96cc">false</OutputCachingOn>
-    <AverageRating xmlns="4873beb7-5857-4685-be1f-d57550cc96cc" xsi:nil="true"/>
-    <LocMarketGroupTiers2 xmlns="4873beb7-5857-4685-be1f-d57550cc96cc" xsi:nil="true"/>
-    <APAuthor xmlns="4873beb7-5857-4685-be1f-d57550cc96cc">
-      <UserInfo>
-        <DisplayName>REDMOND\v-sa</DisplayName>
-        <AccountId>2467</AccountId>
-        <AccountType/>
-      </UserInfo>
-    </APAuthor>
-    <LocManualTestRequired xmlns="4873beb7-5857-4685-be1f-d57550cc96cc">false</LocManualTestRequired>
-    <TPCommandLine xmlns="4873beb7-5857-4685-be1f-d57550cc96cc" xsi:nil="true"/>
-    <TPAppVersion xmlns="4873beb7-5857-4685-be1f-d57550cc96cc" xsi:nil="true"/>
-    <EditorialStatus xmlns="4873beb7-5857-4685-be1f-d57550cc96cc">Complete</EditorialStatus>
-    <LastModifiedDateTime xmlns="4873beb7-5857-4685-be1f-d57550cc96cc" xsi:nil="true"/>
-    <ScenarioTagsTaxHTField0 xmlns="4873beb7-5857-4685-be1f-d57550cc96cc">
-      <Terms xmlns="http://schemas.microsoft.com/office/infopath/2007/PartnerControls"/>
-    </ScenarioTagsTaxHTField0>
-    <OriginalRelease xmlns="4873beb7-5857-4685-be1f-d57550cc96cc">15</OriginalRelease>
-    <TPLaunchHelpLinkType xmlns="4873beb7-5857-4685-be1f-d57550cc96cc">Template</TPLaunchHelpLinkType>
-    <LocalizationTagsTaxHTField0 xmlns="4873beb7-5857-4685-be1f-d57550cc96cc">
-      <Terms xmlns="http://schemas.microsoft.com/office/infopath/2007/PartnerControls"/>
-    </LocalizationTagsTaxHTField0>
-  </documentManagement>
-</p:properties>
-</file>
-
 <file path=customXml/item3.xml><?xml version="1.0" encoding="utf-8"?>
 <?mso-contentType ?>
 <FormTemplates xmlns="http://schemas.microsoft.com/sharepoint/v3/contenttype/forms">
@@ -18976,6 +19047,22 @@
 </file>
 
 <file path=customXml/itemProps1.xml><?xml version="1.0" encoding="utf-8"?>
+<ds:datastoreItem xmlns:ds="http://schemas.openxmlformats.org/officeDocument/2006/customXml" ds:itemID="{B970C04F-E7AC-41AB-9C6D-1B1BB88BFF7F}">
+  <ds:schemaRefs>
+    <ds:schemaRef ds:uri="http://purl.org/dc/terms/"/>
+    <ds:schemaRef ds:uri="http://schemas.openxmlformats.org/package/2006/metadata/core-properties"/>
+    <ds:schemaRef ds:uri="http://schemas.microsoft.com/office/2006/documentManagement/types"/>
+    <ds:schemaRef ds:uri="4873beb7-5857-4685-be1f-d57550cc96cc"/>
+    <ds:schemaRef ds:uri="http://purl.org/dc/elements/1.1/"/>
+    <ds:schemaRef ds:uri="http://schemas.microsoft.com/office/2006/metadata/properties"/>
+    <ds:schemaRef ds:uri="http://schemas.microsoft.com/office/infopath/2007/PartnerControls"/>
+    <ds:schemaRef ds:uri="http://www.w3.org/XML/1998/namespace"/>
+    <ds:schemaRef ds:uri="http://purl.org/dc/dcmitype/"/>
+  </ds:schemaRefs>
+</ds:datastoreItem>
+</file>
+
+<file path=customXml/itemProps2.xml><?xml version="1.0" encoding="utf-8"?>
 <ds:datastoreItem xmlns:ds="http://schemas.openxmlformats.org/officeDocument/2006/customXml" ds:itemID="{63EE7759-C66F-4EA4-9863-7EBA32518D3D}">
   <ds:schemaRefs>
     <ds:schemaRef ds:uri="http://schemas.microsoft.com/office/2006/metadata/contentType"/>
@@ -18993,22 +19080,6 @@
 </ds:datastoreItem>
 </file>
 
-<file path=customXml/itemProps2.xml><?xml version="1.0" encoding="utf-8"?>
-<ds:datastoreItem xmlns:ds="http://schemas.openxmlformats.org/officeDocument/2006/customXml" ds:itemID="{B970C04F-E7AC-41AB-9C6D-1B1BB88BFF7F}">
-  <ds:schemaRefs>
-    <ds:schemaRef ds:uri="http://purl.org/dc/terms/"/>
-    <ds:schemaRef ds:uri="http://schemas.openxmlformats.org/package/2006/metadata/core-properties"/>
-    <ds:schemaRef ds:uri="http://schemas.microsoft.com/office/2006/documentManagement/types"/>
-    <ds:schemaRef ds:uri="4873beb7-5857-4685-be1f-d57550cc96cc"/>
-    <ds:schemaRef ds:uri="http://purl.org/dc/elements/1.1/"/>
-    <ds:schemaRef ds:uri="http://schemas.microsoft.com/office/2006/metadata/properties"/>
-    <ds:schemaRef ds:uri="http://schemas.microsoft.com/office/infopath/2007/PartnerControls"/>
-    <ds:schemaRef ds:uri="http://www.w3.org/XML/1998/namespace"/>
-    <ds:schemaRef ds:uri="http://purl.org/dc/dcmitype/"/>
-  </ds:schemaRefs>
-</ds:datastoreItem>
-</file>
-
 <file path=customXml/itemProps3.xml><?xml version="1.0" encoding="utf-8"?>
 <ds:datastoreItem xmlns:ds="http://schemas.openxmlformats.org/officeDocument/2006/customXml" ds:itemID="{C3DEC53A-9DF1-4780-BE92-17E971B7A9ED}">
   <ds:schemaRefs>

</xml_diff>